<commit_message>
project meeting slides - 2016-12-12
</commit_message>
<xml_diff>
--- a/project meeting slides/project meeting 6.pptx
+++ b/project meeting slides/project meeting 6.pptx
@@ -8983,6 +8983,29 @@
           </a:p>
         </p:txBody>
       </p:sp>
+      <p:pic>
+        <p:nvPicPr>
+          <p:cNvPr id="3" name="Bildobjekt 2"/>
+          <p:cNvPicPr>
+            <a:picLocks noChangeAspect="1"/>
+          </p:cNvPicPr>
+          <p:nvPr/>
+        </p:nvPicPr>
+        <p:blipFill rotWithShape="1">
+          <a:blip r:embed="rId2"/>
+          <a:srcRect t="17877" r="41321" b="5505"/>
+          <a:stretch/>
+        </p:blipFill>
+        <p:spPr>
+          <a:xfrm>
+            <a:off x="1730618" y="1129975"/>
+            <a:ext cx="8730761" cy="5403800"/>
+          </a:xfrm>
+          <a:prstGeom prst="rect">
+            <a:avLst/>
+          </a:prstGeom>
+        </p:spPr>
+      </p:pic>
     </p:spTree>
     <p:extLst>
       <p:ext uri="{BB962C8B-B14F-4D97-AF65-F5344CB8AC3E}">
@@ -9117,6 +9140,29 @@
           </a:p>
         </p:txBody>
       </p:sp>
+      <p:pic>
+        <p:nvPicPr>
+          <p:cNvPr id="3" name="Bildobjekt 2"/>
+          <p:cNvPicPr>
+            <a:picLocks noChangeAspect="1"/>
+          </p:cNvPicPr>
+          <p:nvPr/>
+        </p:nvPicPr>
+        <p:blipFill rotWithShape="1">
+          <a:blip r:embed="rId2"/>
+          <a:srcRect t="17151" r="44387" b="4432"/>
+          <a:stretch/>
+        </p:blipFill>
+        <p:spPr>
+          <a:xfrm>
+            <a:off x="2327764" y="1131218"/>
+            <a:ext cx="7027251" cy="5573753"/>
+          </a:xfrm>
+          <a:prstGeom prst="rect">
+            <a:avLst/>
+          </a:prstGeom>
+        </p:spPr>
+      </p:pic>
     </p:spTree>
     <p:extLst>
       <p:ext uri="{BB962C8B-B14F-4D97-AF65-F5344CB8AC3E}">
@@ -9861,7 +9907,7 @@
           <p:nvPr>
             <p:extLst>
               <p:ext uri="{D42A27DB-BD31-4B8C-83A1-F6EECF244321}">
-                <p14:modId xmlns:p14="http://schemas.microsoft.com/office/powerpoint/2010/main" val="3532403664"/>
+                <p14:modId xmlns:p14="http://schemas.microsoft.com/office/powerpoint/2010/main" val="2514562361"/>
               </p:ext>
             </p:extLst>
           </p:nvPr>
@@ -10163,7 +10209,10 @@
                     <a:bodyPr/>
                     <a:lstStyle/>
                     <a:p>
-                      <a:endParaRPr lang="sv-SE" sz="1900" dirty="0"/>
+                      <a:r>
+                        <a:rPr lang="sv-SE" sz="1900" dirty="0"/>
+                        <a:t>18</a:t>
+                      </a:r>
                     </a:p>
                   </a:txBody>
                   <a:tcPr marL="96677" marR="96677" marT="48338" marB="48338"/>
@@ -10173,7 +10222,10 @@
                     <a:bodyPr/>
                     <a:lstStyle/>
                     <a:p>
-                      <a:endParaRPr lang="sv-SE" sz="1900" dirty="0"/>
+                      <a:r>
+                        <a:rPr lang="sv-SE" sz="1900" dirty="0"/>
+                        <a:t>63</a:t>
+                      </a:r>
                     </a:p>
                   </a:txBody>
                   <a:tcPr marL="96677" marR="96677" marT="48338" marB="48338"/>
@@ -10260,7 +10312,10 @@
                     <a:bodyPr/>
                     <a:lstStyle/>
                     <a:p>
-                      <a:endParaRPr lang="sv-SE" sz="1900" dirty="0"/>
+                      <a:r>
+                        <a:rPr lang="sv-SE" sz="1900" dirty="0"/>
+                        <a:t>15</a:t>
+                      </a:r>
                     </a:p>
                   </a:txBody>
                   <a:tcPr marL="96677" marR="96677" marT="48338" marB="48338"/>
@@ -10270,7 +10325,10 @@
                     <a:bodyPr/>
                     <a:lstStyle/>
                     <a:p>
-                      <a:endParaRPr lang="sv-SE" sz="1900" dirty="0"/>
+                      <a:r>
+                        <a:rPr lang="sv-SE" sz="1900" dirty="0"/>
+                        <a:t>56</a:t>
+                      </a:r>
                     </a:p>
                   </a:txBody>
                   <a:tcPr marL="96677" marR="96677" marT="48338" marB="48338"/>
@@ -10457,7 +10515,7 @@
                     <a:p>
                       <a:r>
                         <a:rPr lang="sv-SE" sz="1900" dirty="0"/>
-                        <a:t>15</a:t>
+                        <a:t>16</a:t>
                       </a:r>
                     </a:p>
                   </a:txBody>
@@ -10660,7 +10718,10 @@
                     <a:bodyPr/>
                     <a:lstStyle/>
                     <a:p>
-                      <a:endParaRPr lang="sv-SE" sz="1900" dirty="0"/>
+                      <a:r>
+                        <a:rPr lang="sv-SE" sz="1900" dirty="0"/>
+                        <a:t>15</a:t>
+                      </a:r>
                     </a:p>
                   </a:txBody>
                   <a:tcPr marL="96677" marR="96677" marT="48338" marB="48338"/>
@@ -10670,7 +10731,10 @@
                     <a:bodyPr/>
                     <a:lstStyle/>
                     <a:p>
-                      <a:endParaRPr lang="sv-SE" sz="1900" dirty="0"/>
+                      <a:r>
+                        <a:rPr lang="sv-SE" sz="1900" dirty="0"/>
+                        <a:t>52</a:t>
+                      </a:r>
                     </a:p>
                   </a:txBody>
                   <a:tcPr marL="96677" marR="96677" marT="48338" marB="48338"/>

</xml_diff>